<commit_message>
Adding more feature files
</commit_message>
<xml_diff>
--- a/SpecFlowTest.Tests/UA5 - Manage Clients/US2 - create a client/US2 - create a client.pptx
+++ b/SpecFlowTest.Tests/UA5 - Manage Clients/US2 - create a client/US2 - create a client.pptx
@@ -253,7 +253,7 @@
           <a:p>
             <a:fld id="{1CB4EACD-983F-4DD9-B729-528BBFA63606}" type="datetimeFigureOut">
               <a:rPr lang="en-GB" smtClean="0"/>
-              <a:t>24/04/2015</a:t>
+              <a:t>28/04/2015</a:t>
             </a:fld>
             <a:endParaRPr lang="en-GB"/>
           </a:p>
@@ -530,7 +530,7 @@
           <a:p>
             <a:fld id="{1CB4EACD-983F-4DD9-B729-528BBFA63606}" type="datetimeFigureOut">
               <a:rPr lang="en-GB" smtClean="0"/>
-              <a:t>24/04/2015</a:t>
+              <a:t>28/04/2015</a:t>
             </a:fld>
             <a:endParaRPr lang="en-GB"/>
           </a:p>
@@ -783,7 +783,7 @@
           <a:p>
             <a:fld id="{1CB4EACD-983F-4DD9-B729-528BBFA63606}" type="datetimeFigureOut">
               <a:rPr lang="en-GB" smtClean="0"/>
-              <a:t>24/04/2015</a:t>
+              <a:t>28/04/2015</a:t>
             </a:fld>
             <a:endParaRPr lang="en-GB"/>
           </a:p>
@@ -953,7 +953,7 @@
           <a:p>
             <a:fld id="{1CB4EACD-983F-4DD9-B729-528BBFA63606}" type="datetimeFigureOut">
               <a:rPr lang="en-GB" smtClean="0"/>
-              <a:t>24/04/2015</a:t>
+              <a:t>28/04/2015</a:t>
             </a:fld>
             <a:endParaRPr lang="en-GB"/>
           </a:p>
@@ -1133,7 +1133,7 @@
           <a:p>
             <a:fld id="{1CB4EACD-983F-4DD9-B729-528BBFA63606}" type="datetimeFigureOut">
               <a:rPr lang="en-GB" smtClean="0"/>
-              <a:t>24/04/2015</a:t>
+              <a:t>28/04/2015</a:t>
             </a:fld>
             <a:endParaRPr lang="en-GB"/>
           </a:p>
@@ -1303,7 +1303,7 @@
           <a:p>
             <a:fld id="{1CB4EACD-983F-4DD9-B729-528BBFA63606}" type="datetimeFigureOut">
               <a:rPr lang="en-GB" smtClean="0"/>
-              <a:t>24/04/2015</a:t>
+              <a:t>28/04/2015</a:t>
             </a:fld>
             <a:endParaRPr lang="en-GB"/>
           </a:p>
@@ -1549,7 +1549,7 @@
           <a:p>
             <a:fld id="{1CB4EACD-983F-4DD9-B729-528BBFA63606}" type="datetimeFigureOut">
               <a:rPr lang="en-GB" smtClean="0"/>
-              <a:t>24/04/2015</a:t>
+              <a:t>28/04/2015</a:t>
             </a:fld>
             <a:endParaRPr lang="en-GB"/>
           </a:p>
@@ -1781,7 +1781,7 @@
           <a:p>
             <a:fld id="{1CB4EACD-983F-4DD9-B729-528BBFA63606}" type="datetimeFigureOut">
               <a:rPr lang="en-GB" smtClean="0"/>
-              <a:t>24/04/2015</a:t>
+              <a:t>28/04/2015</a:t>
             </a:fld>
             <a:endParaRPr lang="en-GB"/>
           </a:p>
@@ -2148,7 +2148,7 @@
           <a:p>
             <a:fld id="{1CB4EACD-983F-4DD9-B729-528BBFA63606}" type="datetimeFigureOut">
               <a:rPr lang="en-GB" smtClean="0"/>
-              <a:t>24/04/2015</a:t>
+              <a:t>28/04/2015</a:t>
             </a:fld>
             <a:endParaRPr lang="en-GB"/>
           </a:p>
@@ -2266,7 +2266,7 @@
           <a:p>
             <a:fld id="{1CB4EACD-983F-4DD9-B729-528BBFA63606}" type="datetimeFigureOut">
               <a:rPr lang="en-GB" smtClean="0"/>
-              <a:t>24/04/2015</a:t>
+              <a:t>28/04/2015</a:t>
             </a:fld>
             <a:endParaRPr lang="en-GB"/>
           </a:p>
@@ -2394,7 +2394,7 @@
           <a:p>
             <a:fld id="{1CB4EACD-983F-4DD9-B729-528BBFA63606}" type="datetimeFigureOut">
               <a:rPr lang="en-GB" smtClean="0"/>
-              <a:t>24/04/2015</a:t>
+              <a:t>28/04/2015</a:t>
             </a:fld>
             <a:endParaRPr lang="en-GB"/>
           </a:p>
@@ -6982,7 +6982,7 @@
           <a:p>
             <a:fld id="{1CB4EACD-983F-4DD9-B729-528BBFA63606}" type="datetimeFigureOut">
               <a:rPr lang="en-GB" smtClean="0"/>
-              <a:t>24/04/2015</a:t>
+              <a:t>28/04/2015</a:t>
             </a:fld>
             <a:endParaRPr lang="en-GB"/>
           </a:p>
@@ -14715,7 +14715,7 @@
           <a:p>
             <a:fld id="{1CB4EACD-983F-4DD9-B729-528BBFA63606}" type="datetimeFigureOut">
               <a:rPr lang="en-GB" smtClean="0"/>
-              <a:t>24/04/2015</a:t>
+              <a:t>28/04/2015</a:t>
             </a:fld>
             <a:endParaRPr lang="en-GB"/>
           </a:p>
@@ -14928,7 +14928,7 @@
           <a:p>
             <a:fld id="{1CB4EACD-983F-4DD9-B729-528BBFA63606}" type="datetimeFigureOut">
               <a:rPr lang="en-GB" smtClean="0"/>
-              <a:t>24/04/2015</a:t>
+              <a:t>28/04/2015</a:t>
             </a:fld>
             <a:endParaRPr lang="en-GB"/>
           </a:p>

</xml_diff>